<commit_message>
04/01/23 Fixed all bold hymn switching for HC
</commit_message>
<xml_diff>
--- a/TJCPowerPoint/bin/Debug/Files/ServiceWidescreen.pptx
+++ b/TJCPowerPoint/bin/Debug/Files/ServiceWidescreen.pptx
@@ -4145,62 +4145,6 @@
           </a:p>
         </p:txBody>
       </p:sp>
-      <p:sp>
-        <p:nvSpPr>
-          <p:cNvPr id="10" name="TextBox 9">
-            <a:extLst>
-              <a:ext uri="{FF2B5EF4-FFF2-40B4-BE49-F238E27FC236}">
-                <a16:creationId xmlns:a16="http://schemas.microsoft.com/office/drawing/2014/main" id="{6DA65BC6-CF8D-7742-7648-A497F05CD732}"/>
-              </a:ext>
-            </a:extLst>
-          </p:cNvPr>
-          <p:cNvSpPr txBox="1"/>
-          <p:nvPr/>
-        </p:nvSpPr>
-        <p:spPr>
-          <a:xfrm>
-            <a:off x="5231904" y="6023029"/>
-            <a:ext cx="6395128" cy="646331"/>
-          </a:xfrm>
-          <a:prstGeom prst="rect">
-            <a:avLst/>
-          </a:prstGeom>
-          <a:noFill/>
-          <a:ln w="19050">
-            <a:noFill/>
-          </a:ln>
-        </p:spPr>
-        <p:txBody>
-          <a:bodyPr wrap="square" rtlCol="0" anchor="ctr">
-            <a:spAutoFit/>
-          </a:bodyPr>
-          <a:lstStyle/>
-          <a:p>
-            <a:pPr algn="r"/>
-            <a:r>
-              <a:rPr lang="en-GB" dirty="0">
-                <a:latin typeface="Segoe UI Semibold" panose="020B0702040204020203" pitchFamily="34" charset="0"/>
-                <a:cs typeface="Segoe UI Semibold" panose="020B0702040204020203" pitchFamily="34" charset="0"/>
-              </a:rPr>
-              <a:t>Please Turn Off/Silence Your Devices </a:t>
-            </a:r>
-          </a:p>
-          <a:p>
-            <a:pPr algn="r"/>
-            <a:r>
-              <a:rPr lang="zh-TW" altLang="en-US" b="1" dirty="0">
-                <a:latin typeface="Microsoft JhengHei" panose="020B0604030504040204" pitchFamily="34" charset="-120"/>
-                <a:ea typeface="Microsoft JhengHei" panose="020B0604030504040204" pitchFamily="34" charset="-120"/>
-              </a:rPr>
-              <a:t>請靜音或關閉所有電子設備</a:t>
-            </a:r>
-            <a:endParaRPr lang="ja-JP" altLang="en-US" b="1" dirty="0">
-              <a:latin typeface="Microsoft JhengHei" panose="020B0604030504040204" pitchFamily="34" charset="-120"/>
-              <a:ea typeface="Microsoft JhengHei" panose="020B0604030504040204" pitchFamily="34" charset="-120"/>
-            </a:endParaRPr>
-          </a:p>
-        </p:txBody>
-      </p:sp>
       <p:pic>
         <p:nvPicPr>
           <p:cNvPr id="11" name="Picture 10" descr="Shape&#10;&#10;Description automatically generated with low confidence">
@@ -4244,7 +4188,7 @@
         </p:blipFill>
         <p:spPr>
           <a:xfrm>
-            <a:off x="11544706" y="6093296"/>
+            <a:off x="11502624" y="6021645"/>
             <a:ext cx="508138" cy="508138"/>
           </a:xfrm>
           <a:prstGeom prst="rect">
@@ -4434,7 +4378,7 @@
                 <a:cs typeface="Segoe UI" panose="020B0502040204020203" pitchFamily="34" charset="0"/>
               </a:rPr>
               <a:pPr algn="r"/>
-              <a:t>Tuesday, December 27, 2022</a:t>
+              <a:t>Monday, January 2, 2023</a:t>
             </a:fld>
             <a:endParaRPr lang="en-US" altLang="en-US" sz="3600" b="1" dirty="0">
               <a:solidFill>
@@ -4492,6 +4436,64 @@
           </a:prstGeom>
         </p:spPr>
       </p:pic>
+      <p:sp>
+        <p:nvSpPr>
+          <p:cNvPr id="7" name="TextBox 6">
+            <a:extLst>
+              <a:ext uri="{FF2B5EF4-FFF2-40B4-BE49-F238E27FC236}">
+                <a16:creationId xmlns:a16="http://schemas.microsoft.com/office/drawing/2014/main" id="{416F70EC-4301-ED90-9F3F-3259823B803F}"/>
+              </a:ext>
+            </a:extLst>
+          </p:cNvPr>
+          <p:cNvSpPr txBox="1"/>
+          <p:nvPr/>
+        </p:nvSpPr>
+        <p:spPr>
+          <a:xfrm>
+            <a:off x="7115825" y="5877272"/>
+            <a:ext cx="4524791" cy="796885"/>
+          </a:xfrm>
+          <a:prstGeom prst="roundRect">
+            <a:avLst>
+              <a:gd name="adj" fmla="val 20010"/>
+            </a:avLst>
+          </a:prstGeom>
+          <a:noFill/>
+          <a:ln w="19050">
+            <a:noFill/>
+          </a:ln>
+        </p:spPr>
+        <p:txBody>
+          <a:bodyPr wrap="square" rtlCol="0" anchor="ctr">
+            <a:spAutoFit/>
+          </a:bodyPr>
+          <a:lstStyle/>
+          <a:p>
+            <a:pPr algn="r"/>
+            <a:r>
+              <a:rPr lang="en-GB" sz="2000" dirty="0">
+                <a:latin typeface="Segoe UI Semibold" panose="020B0702040204020203" pitchFamily="34" charset="0"/>
+                <a:cs typeface="Segoe UI Semibold" panose="020B0702040204020203" pitchFamily="34" charset="0"/>
+              </a:rPr>
+              <a:t>Please Turn Off/Silence Your Devices</a:t>
+            </a:r>
+          </a:p>
+          <a:p>
+            <a:pPr algn="r"/>
+            <a:r>
+              <a:rPr lang="zh-TW" altLang="en-US" sz="2000" b="1" dirty="0">
+                <a:latin typeface="Microsoft JhengHei" panose="020B0604030504040204" pitchFamily="34" charset="-120"/>
+                <a:ea typeface="Microsoft JhengHei" panose="020B0604030504040204" pitchFamily="34" charset="-120"/>
+              </a:rPr>
+              <a:t>請靜音或關閉所有電子設備</a:t>
+            </a:r>
+            <a:endParaRPr lang="ja-JP" altLang="en-US" sz="2000" b="1" dirty="0">
+              <a:latin typeface="Microsoft JhengHei" panose="020B0604030504040204" pitchFamily="34" charset="-120"/>
+              <a:ea typeface="Microsoft JhengHei" panose="020B0604030504040204" pitchFamily="34" charset="-120"/>
+            </a:endParaRPr>
+          </a:p>
+        </p:txBody>
+      </p:sp>
     </p:spTree>
     <p:extLst>
       <p:ext uri="{BB962C8B-B14F-4D97-AF65-F5344CB8AC3E}">
@@ -6235,7 +6237,7 @@
                 <a:latin typeface="Century Gothic" panose="020B0502020202020204" pitchFamily="34" charset="0"/>
                 <a:ea typeface="金梅新中楷全字體" panose="02010509060101010101" pitchFamily="49" charset="-120"/>
               </a:rPr>
-              <a:t>Hymn Nos</a:t>
+              <a:t>Hymn No.</a:t>
             </a:r>
           </a:p>
         </p:txBody>
@@ -7443,12 +7445,16 @@
               </a:lnSpc>
             </a:pPr>
             <a:r>
-              <a:rPr lang="en-GB" sz="4400" dirty="0">
+              <a:rPr lang="en-GB" sz="4400">
                 <a:latin typeface="Century Gothic" panose="020B0502020202020204" pitchFamily="34" charset="0"/>
                 <a:cs typeface="Segoe UI" panose="020B0502040204020203" pitchFamily="34" charset="0"/>
               </a:rPr>
-              <a:t>HYMN No</a:t>
-            </a:r>
+              <a:t>Hymn No.</a:t>
+            </a:r>
+            <a:endParaRPr lang="en-GB" sz="4400" dirty="0">
+              <a:latin typeface="Century Gothic" panose="020B0502020202020204" pitchFamily="34" charset="0"/>
+              <a:cs typeface="Segoe UI" panose="020B0502040204020203" pitchFamily="34" charset="0"/>
+            </a:endParaRPr>
           </a:p>
         </p:txBody>
       </p:sp>

</xml_diff>